<commit_message>
updated slide to show Adaptive designer
</commit_message>
<xml_diff>
--- a/ConnectorActionableMsgs/03 Adaptive Cards/01 Adaptive Cards and Actionable Messages.pptx
+++ b/ConnectorActionableMsgs/03 Adaptive Cards/01 Adaptive Cards and Actionable Messages.pptx
@@ -257,7 +257,7 @@
               <a:rPr lang="en-US" smtClean="0">
                 <a:latin typeface="Segoe UI" pitchFamily="34" charset="0"/>
               </a:rPr>
-              <a:t>6/6/2018 7:06 PM</a:t>
+              <a:t>12/17/2018 10:00 AM</a:t>
             </a:fld>
             <a:endParaRPr lang="en-US" dirty="0">
               <a:latin typeface="Segoe UI" pitchFamily="34" charset="0"/>
@@ -551,7 +551,7 @@
           <a:p>
             <a:fld id="{D18B56EA-E28F-4F92-9F16-7A6F2501B303}" type="datetime8">
               <a:rPr lang="en-US" smtClean="0"/>
-              <a:t>6/6/2018 6:47 PM</a:t>
+              <a:t>12/17/2018 9:35 AM</a:t>
             </a:fld>
             <a:endParaRPr lang="en-US" dirty="0"/>
           </a:p>
@@ -934,7 +934,7 @@
           <a:p>
             <a:fld id="{D18B56EA-E28F-4F92-9F16-7A6F2501B303}" type="datetime8">
               <a:rPr lang="en-US" smtClean="0"/>
-              <a:t>6/6/2018 6:47 PM</a:t>
+              <a:t>12/17/2018 9:35 AM</a:t>
             </a:fld>
             <a:endParaRPr lang="en-US" dirty="0"/>
           </a:p>
@@ -1220,7 +1220,7 @@
                 <a:tabLst/>
                 <a:defRPr/>
               </a:pPr>
-              <a:t>6/6/2018 6:47 PM</a:t>
+              <a:t>12/17/2018 9:35 AM</a:t>
             </a:fld>
             <a:endParaRPr kumimoji="0" lang="en-US" sz="1200" b="0" i="0" u="none" strike="noStrike" kern="1200" cap="none" spc="0" normalizeH="0" baseline="0" noProof="0" dirty="0">
               <a:ln>
@@ -1484,7 +1484,7 @@
           <a:p>
             <a:fld id="{D18B56EA-E28F-4F92-9F16-7A6F2501B303}" type="datetime8">
               <a:rPr lang="en-US" smtClean="0"/>
-              <a:t>6/6/2018 6:47 PM</a:t>
+              <a:t>12/17/2018 9:35 AM</a:t>
             </a:fld>
             <a:endParaRPr lang="en-US" dirty="0"/>
           </a:p>
@@ -1668,7 +1668,7 @@
           <a:p>
             <a:fld id="{D18B56EA-E28F-4F92-9F16-7A6F2501B303}" type="datetime8">
               <a:rPr lang="en-US" smtClean="0"/>
-              <a:t>6/6/2018 6:47 PM</a:t>
+              <a:t>12/17/2018 9:35 AM</a:t>
             </a:fld>
             <a:endParaRPr lang="en-US" dirty="0"/>
           </a:p>
@@ -1757,7 +1757,7 @@
           <a:p>
             <a:r>
               <a:rPr lang="en-US" dirty="0"/>
-              <a:t>Use the Adaptive Card Visualize to view samples in the various host applications (from Microsoft)</a:t>
+              <a:t>Use the Adaptive Card Designer to create and view samples in the various host applications (from Microsoft)</a:t>
             </a:r>
           </a:p>
         </p:txBody>
@@ -1852,7 +1852,7 @@
           <a:p>
             <a:fld id="{D18B56EA-E28F-4F92-9F16-7A6F2501B303}" type="datetime8">
               <a:rPr lang="en-US" smtClean="0"/>
-              <a:t>6/6/2018 6:47 PM</a:t>
+              <a:t>12/17/2018 9:35 AM</a:t>
             </a:fld>
             <a:endParaRPr lang="en-US" dirty="0"/>
           </a:p>
@@ -2033,7 +2033,7 @@
           <a:p>
             <a:fld id="{D18B56EA-E28F-4F92-9F16-7A6F2501B303}" type="datetime8">
               <a:rPr lang="en-US" smtClean="0"/>
-              <a:t>6/6/2018 6:47 PM</a:t>
+              <a:t>12/17/2018 9:35 AM</a:t>
             </a:fld>
             <a:endParaRPr lang="en-US" dirty="0"/>
           </a:p>
@@ -2214,7 +2214,7 @@
           <a:p>
             <a:fld id="{D18B56EA-E28F-4F92-9F16-7A6F2501B303}" type="datetime8">
               <a:rPr lang="en-US" smtClean="0"/>
-              <a:t>6/6/2018 6:47 PM</a:t>
+              <a:t>12/17/2018 9:35 AM</a:t>
             </a:fld>
             <a:endParaRPr lang="en-US" dirty="0"/>
           </a:p>
@@ -2395,7 +2395,7 @@
           <a:p>
             <a:fld id="{D18B56EA-E28F-4F92-9F16-7A6F2501B303}" type="datetime8">
               <a:rPr lang="en-US" smtClean="0"/>
-              <a:t>6/6/2018 6:47 PM</a:t>
+              <a:t>12/17/2018 9:35 AM</a:t>
             </a:fld>
             <a:endParaRPr lang="en-US" dirty="0"/>
           </a:p>
@@ -15411,6 +15411,35 @@
           </a:prstGeom>
         </p:spPr>
       </p:pic>
+      <p:pic>
+        <p:nvPicPr>
+          <p:cNvPr id="4" name="Picture 3">
+            <a:extLst>
+              <a:ext uri="{FF2B5EF4-FFF2-40B4-BE49-F238E27FC236}">
+                <a16:creationId xmlns:a16="http://schemas.microsoft.com/office/drawing/2014/main" id="{FD903C16-242F-468C-82C7-568B54F8723F}"/>
+              </a:ext>
+            </a:extLst>
+          </p:cNvPr>
+          <p:cNvPicPr>
+            <a:picLocks noChangeAspect="1"/>
+          </p:cNvPicPr>
+          <p:nvPr/>
+        </p:nvPicPr>
+        <p:blipFill rotWithShape="1">
+          <a:blip r:embed="rId4"/>
+          <a:srcRect b="15562"/>
+          <a:stretch/>
+        </p:blipFill>
+        <p:spPr>
+          <a:xfrm>
+            <a:off x="1989079" y="1602749"/>
+            <a:ext cx="8440205" cy="4432291"/>
+          </a:xfrm>
+          <a:prstGeom prst="rect">
+            <a:avLst/>
+          </a:prstGeom>
+        </p:spPr>
+      </p:pic>
       <p:sp>
         <p:nvSpPr>
           <p:cNvPr id="8" name="Rectangle 7">
@@ -15516,7 +15545,7 @@
           <a:p>
             <a:r>
               <a:rPr lang="en-US" dirty="0"/>
-              <a:t>Adaptive Card Visualizer</a:t>
+              <a:t>Adaptive Card Designer</a:t>
             </a:r>
           </a:p>
         </p:txBody>
@@ -15536,7 +15565,7 @@
         <p:spPr>
           <a:xfrm>
             <a:off x="4418481" y="5864686"/>
-            <a:ext cx="3599512" cy="369332"/>
+            <a:ext cx="3548215" cy="369332"/>
           </a:xfrm>
           <a:prstGeom prst="rect">
             <a:avLst/>
@@ -15554,41 +15583,11 @@
                   <a:schemeClr val="bg2"/>
                 </a:solidFill>
               </a:rPr>
-              <a:t>https://adaptivecards.io/visualizer</a:t>
+              <a:t>https://adaptivecards.io/designer</a:t>
             </a:r>
           </a:p>
         </p:txBody>
       </p:sp>
-      <p:pic>
-        <p:nvPicPr>
-          <p:cNvPr id="7" name="Picture 6" descr="A screenshot of a computer screen&#10;&#10;Description generated with very high confidence">
-            <a:extLst>
-              <a:ext uri="{FF2B5EF4-FFF2-40B4-BE49-F238E27FC236}">
-                <a16:creationId xmlns:a16="http://schemas.microsoft.com/office/drawing/2014/main" id="{F57B4EED-881C-4D23-A996-2919EAC7F5DE}"/>
-              </a:ext>
-            </a:extLst>
-          </p:cNvPr>
-          <p:cNvPicPr>
-            <a:picLocks noChangeAspect="1"/>
-          </p:cNvPicPr>
-          <p:nvPr/>
-        </p:nvPicPr>
-        <p:blipFill>
-          <a:blip r:embed="rId4"/>
-          <a:stretch>
-            <a:fillRect/>
-          </a:stretch>
-        </p:blipFill>
-        <p:spPr>
-          <a:xfrm>
-            <a:off x="1989079" y="1873769"/>
-            <a:ext cx="8440205" cy="3838810"/>
-          </a:xfrm>
-          <a:prstGeom prst="rect">
-            <a:avLst/>
-          </a:prstGeom>
-        </p:spPr>
-      </p:pic>
     </p:spTree>
     <p:extLst>
       <p:ext uri="{BB962C8B-B14F-4D97-AF65-F5344CB8AC3E}">

</xml_diff>

<commit_message>
Added slide for signed payload messages
</commit_message>
<xml_diff>
--- a/ConnectorActionableMsgs/03 Adaptive Cards/01 Adaptive Cards and Actionable Messages.pptx
+++ b/ConnectorActionableMsgs/03 Adaptive Cards/01 Adaptive Cards and Actionable Messages.pptx
@@ -5,10 +5,10 @@
     <p:sldMasterId id="2147484229" r:id="rId1"/>
   </p:sldMasterIdLst>
   <p:notesMasterIdLst>
-    <p:notesMasterId r:id="rId13"/>
+    <p:notesMasterId r:id="rId14"/>
   </p:notesMasterIdLst>
   <p:handoutMasterIdLst>
-    <p:handoutMasterId r:id="rId14"/>
+    <p:handoutMasterId r:id="rId15"/>
   </p:handoutMasterIdLst>
   <p:sldIdLst>
     <p:sldId id="257" r:id="rId2"/>
@@ -18,10 +18,11 @@
     <p:sldId id="293" r:id="rId6"/>
     <p:sldId id="310" r:id="rId7"/>
     <p:sldId id="313" r:id="rId8"/>
-    <p:sldId id="265" r:id="rId9"/>
-    <p:sldId id="307" r:id="rId10"/>
-    <p:sldId id="261" r:id="rId11"/>
-    <p:sldId id="260" r:id="rId12"/>
+    <p:sldId id="314" r:id="rId9"/>
+    <p:sldId id="265" r:id="rId10"/>
+    <p:sldId id="307" r:id="rId11"/>
+    <p:sldId id="261" r:id="rId12"/>
+    <p:sldId id="260" r:id="rId13"/>
   </p:sldIdLst>
   <p:sldSz cx="12436475" cy="6994525"/>
   <p:notesSz cx="6858000" cy="9144000"/>
@@ -132,6 +133,7 @@
             <p14:sldId id="293"/>
             <p14:sldId id="310"/>
             <p14:sldId id="313"/>
+            <p14:sldId id="314"/>
             <p14:sldId id="265"/>
           </p14:sldIdLst>
         </p14:section>
@@ -257,7 +259,7 @@
               <a:rPr lang="en-US" smtClean="0">
                 <a:latin typeface="Segoe UI" pitchFamily="34" charset="0"/>
               </a:rPr>
-              <a:t>12/17/2018 10:00 AM</a:t>
+              <a:t>3/14/2019 3:57 PM</a:t>
             </a:fld>
             <a:endParaRPr lang="en-US" dirty="0">
               <a:latin typeface="Segoe UI" pitchFamily="34" charset="0"/>
@@ -551,7 +553,7 @@
           <a:p>
             <a:fld id="{D18B56EA-E28F-4F92-9F16-7A6F2501B303}" type="datetime8">
               <a:rPr lang="en-US" smtClean="0"/>
-              <a:t>12/17/2018 9:35 AM</a:t>
+              <a:t>3/14/2019 3:56 PM</a:t>
             </a:fld>
             <a:endParaRPr lang="en-US" dirty="0"/>
           </a:p>
@@ -934,7 +936,7 @@
           <a:p>
             <a:fld id="{D18B56EA-E28F-4F92-9F16-7A6F2501B303}" type="datetime8">
               <a:rPr lang="en-US" smtClean="0"/>
-              <a:t>12/17/2018 9:35 AM</a:t>
+              <a:t>3/14/2019 3:56 PM</a:t>
             </a:fld>
             <a:endParaRPr lang="en-US" dirty="0"/>
           </a:p>
@@ -1220,7 +1222,7 @@
                 <a:tabLst/>
                 <a:defRPr/>
               </a:pPr>
-              <a:t>12/17/2018 9:35 AM</a:t>
+              <a:t>3/14/2019 3:56 PM</a:t>
             </a:fld>
             <a:endParaRPr kumimoji="0" lang="en-US" sz="1200" b="0" i="0" u="none" strike="noStrike" kern="1200" cap="none" spc="0" normalizeH="0" baseline="0" noProof="0" dirty="0">
               <a:ln>
@@ -1484,7 +1486,7 @@
           <a:p>
             <a:fld id="{D18B56EA-E28F-4F92-9F16-7A6F2501B303}" type="datetime8">
               <a:rPr lang="en-US" smtClean="0"/>
-              <a:t>12/17/2018 9:35 AM</a:t>
+              <a:t>3/14/2019 3:56 PM</a:t>
             </a:fld>
             <a:endParaRPr lang="en-US" dirty="0"/>
           </a:p>
@@ -1668,7 +1670,7 @@
           <a:p>
             <a:fld id="{D18B56EA-E28F-4F92-9F16-7A6F2501B303}" type="datetime8">
               <a:rPr lang="en-US" smtClean="0"/>
-              <a:t>12/17/2018 9:35 AM</a:t>
+              <a:t>3/14/2019 3:56 PM</a:t>
             </a:fld>
             <a:endParaRPr lang="en-US" dirty="0"/>
           </a:p>
@@ -1852,7 +1854,7 @@
           <a:p>
             <a:fld id="{D18B56EA-E28F-4F92-9F16-7A6F2501B303}" type="datetime8">
               <a:rPr lang="en-US" smtClean="0"/>
-              <a:t>12/17/2018 9:35 AM</a:t>
+              <a:t>3/14/2019 3:56 PM</a:t>
             </a:fld>
             <a:endParaRPr lang="en-US" dirty="0"/>
           </a:p>
@@ -2033,7 +2035,7 @@
           <a:p>
             <a:fld id="{D18B56EA-E28F-4F92-9F16-7A6F2501B303}" type="datetime8">
               <a:rPr lang="en-US" smtClean="0"/>
-              <a:t>12/17/2018 9:35 AM</a:t>
+              <a:t>3/14/2019 3:56 PM</a:t>
             </a:fld>
             <a:endParaRPr lang="en-US" dirty="0"/>
           </a:p>
@@ -2057,7 +2059,7 @@
             <a:fld id="{B4008EB6-D09E-4580-8CD6-DDB14511944F}" type="slidenum">
               <a:rPr lang="en-US" smtClean="0"/>
               <a:pPr/>
-              <a:t>8</a:t>
+              <a:t>9</a:t>
             </a:fld>
             <a:endParaRPr lang="en-US" dirty="0"/>
           </a:p>
@@ -2214,7 +2216,7 @@
           <a:p>
             <a:fld id="{D18B56EA-E28F-4F92-9F16-7A6F2501B303}" type="datetime8">
               <a:rPr lang="en-US" smtClean="0"/>
-              <a:t>12/17/2018 9:35 AM</a:t>
+              <a:t>3/14/2019 3:56 PM</a:t>
             </a:fld>
             <a:endParaRPr lang="en-US" dirty="0"/>
           </a:p>
@@ -2238,7 +2240,7 @@
             <a:fld id="{B4008EB6-D09E-4580-8CD6-DDB14511944F}" type="slidenum">
               <a:rPr lang="en-US" smtClean="0"/>
               <a:pPr/>
-              <a:t>10</a:t>
+              <a:t>11</a:t>
             </a:fld>
             <a:endParaRPr lang="en-US" dirty="0"/>
           </a:p>
@@ -2395,7 +2397,7 @@
           <a:p>
             <a:fld id="{D18B56EA-E28F-4F92-9F16-7A6F2501B303}" type="datetime8">
               <a:rPr lang="en-US" smtClean="0"/>
-              <a:t>12/17/2018 9:35 AM</a:t>
+              <a:t>3/14/2019 3:56 PM</a:t>
             </a:fld>
             <a:endParaRPr lang="en-US" dirty="0"/>
           </a:p>
@@ -2419,7 +2421,7 @@
             <a:fld id="{B4008EB6-D09E-4580-8CD6-DDB14511944F}" type="slidenum">
               <a:rPr lang="en-US" smtClean="0"/>
               <a:pPr/>
-              <a:t>11</a:t>
+              <a:t>12</a:t>
             </a:fld>
             <a:endParaRPr lang="en-US" dirty="0"/>
           </a:p>
@@ -12925,6 +12927,358 @@
           <a:chExt cx="0" cy="0"/>
         </a:xfrm>
       </p:grpSpPr>
+      <p:pic>
+        <p:nvPicPr>
+          <p:cNvPr id="3" name="Picture 2">
+            <a:extLst>
+              <a:ext uri="{FF2B5EF4-FFF2-40B4-BE49-F238E27FC236}">
+                <a16:creationId xmlns:a16="http://schemas.microsoft.com/office/drawing/2014/main" id="{EE215EA7-7174-487D-949C-048DC5016E47}"/>
+              </a:ext>
+            </a:extLst>
+          </p:cNvPr>
+          <p:cNvPicPr>
+            <a:picLocks noChangeAspect="1"/>
+          </p:cNvPicPr>
+          <p:nvPr/>
+        </p:nvPicPr>
+        <p:blipFill rotWithShape="1">
+          <a:blip r:embed="rId2" cstate="screen">
+            <a:extLst>
+              <a:ext uri="{28A0092B-C50C-407E-A947-70E740481C1C}">
+                <a14:useLocalDpi xmlns:a14="http://schemas.microsoft.com/office/drawing/2010/main"/>
+              </a:ext>
+            </a:extLst>
+          </a:blip>
+          <a:srcRect l="27426" r="10166"/>
+          <a:stretch/>
+        </p:blipFill>
+        <p:spPr>
+          <a:xfrm>
+            <a:off x="5887091" y="0"/>
+            <a:ext cx="6549384" cy="6994525"/>
+          </a:xfrm>
+          <a:prstGeom prst="rect">
+            <a:avLst/>
+          </a:prstGeom>
+        </p:spPr>
+      </p:pic>
+      <p:sp>
+        <p:nvSpPr>
+          <p:cNvPr id="4" name="Title 3">
+            <a:extLst>
+              <a:ext uri="{FF2B5EF4-FFF2-40B4-BE49-F238E27FC236}">
+                <a16:creationId xmlns:a16="http://schemas.microsoft.com/office/drawing/2014/main" id="{8047349F-0B8F-4D12-A39C-718C1C57DDFF}"/>
+              </a:ext>
+            </a:extLst>
+          </p:cNvPr>
+          <p:cNvSpPr>
+            <a:spLocks noGrp="1"/>
+          </p:cNvSpPr>
+          <p:nvPr>
+            <p:ph type="title"/>
+          </p:nvPr>
+        </p:nvSpPr>
+        <p:spPr>
+          <a:xfrm>
+            <a:off x="454864" y="1843063"/>
+            <a:ext cx="11533187" cy="411162"/>
+          </a:xfrm>
+        </p:spPr>
+        <p:txBody>
+          <a:bodyPr/>
+          <a:lstStyle/>
+          <a:p>
+            <a:r>
+              <a:rPr lang="en-US" dirty="0"/>
+              <a:t>Summary</a:t>
+            </a:r>
+          </a:p>
+        </p:txBody>
+      </p:sp>
+      <p:sp>
+        <p:nvSpPr>
+          <p:cNvPr id="10" name="Text Placeholder 6">
+            <a:extLst>
+              <a:ext uri="{FF2B5EF4-FFF2-40B4-BE49-F238E27FC236}">
+                <a16:creationId xmlns:a16="http://schemas.microsoft.com/office/drawing/2014/main" id="{61D48218-75E0-4C6C-BFA7-A1010BADED35}"/>
+              </a:ext>
+            </a:extLst>
+          </p:cNvPr>
+          <p:cNvSpPr txBox="1">
+            <a:spLocks/>
+          </p:cNvSpPr>
+          <p:nvPr/>
+        </p:nvSpPr>
+        <p:spPr>
+          <a:xfrm>
+            <a:off x="465139" y="2621905"/>
+            <a:ext cx="4234184" cy="221599"/>
+          </a:xfrm>
+          <a:prstGeom prst="rect">
+            <a:avLst/>
+          </a:prstGeom>
+        </p:spPr>
+        <p:txBody>
+          <a:bodyPr vert="horz" wrap="square" lIns="0" tIns="0" rIns="0" bIns="0" rtlCol="0">
+            <a:spAutoFit/>
+          </a:bodyPr>
+          <a:lstStyle>
+            <a:lvl1pPr marL="0" marR="0" indent="0" algn="l" defTabSz="932742" rtl="0" eaLnBrk="1" fontAlgn="auto" latinLnBrk="0" hangingPunct="1">
+              <a:lnSpc>
+                <a:spcPts val="1800"/>
+              </a:lnSpc>
+              <a:spcBef>
+                <a:spcPts val="0"/>
+              </a:spcBef>
+              <a:spcAft>
+                <a:spcPts val="0"/>
+              </a:spcAft>
+              <a:buClrTx/>
+              <a:buSzPct val="90000"/>
+              <a:buFont typeface="Wingdings" panose="05000000000000000000" pitchFamily="2" charset="2"/>
+              <a:buNone/>
+              <a:tabLst/>
+              <a:defRPr sz="1400" b="1" kern="1200" spc="0" baseline="0">
+                <a:solidFill>
+                  <a:schemeClr val="tx1"/>
+                </a:solidFill>
+                <a:latin typeface="+mn-lt"/>
+                <a:ea typeface="+mn-ea"/>
+                <a:cs typeface="+mn-cs"/>
+              </a:defRPr>
+            </a:lvl1pPr>
+            <a:lvl2pPr marL="0" marR="0" indent="0" algn="l" defTabSz="932742" rtl="0" eaLnBrk="1" fontAlgn="auto" latinLnBrk="0" hangingPunct="1">
+              <a:lnSpc>
+                <a:spcPts val="1800"/>
+              </a:lnSpc>
+              <a:spcBef>
+                <a:spcPts val="0"/>
+              </a:spcBef>
+              <a:spcAft>
+                <a:spcPts val="0"/>
+              </a:spcAft>
+              <a:buClrTx/>
+              <a:buSzPct val="90000"/>
+              <a:buFont typeface="Wingdings" panose="05000000000000000000" pitchFamily="2" charset="2"/>
+              <a:buNone/>
+              <a:tabLst/>
+              <a:defRPr sz="1400" kern="1200" spc="0" baseline="0">
+                <a:solidFill>
+                  <a:schemeClr val="tx1"/>
+                </a:solidFill>
+                <a:latin typeface="+mn-lt"/>
+                <a:ea typeface="+mn-ea"/>
+                <a:cs typeface="+mn-cs"/>
+              </a:defRPr>
+            </a:lvl2pPr>
+            <a:lvl3pPr marL="457200" marR="0" indent="0" algn="l" defTabSz="932742" rtl="0" eaLnBrk="1" fontAlgn="auto" latinLnBrk="0" hangingPunct="1">
+              <a:lnSpc>
+                <a:spcPct val="90000"/>
+              </a:lnSpc>
+              <a:spcBef>
+                <a:spcPct val="20000"/>
+              </a:spcBef>
+              <a:spcAft>
+                <a:spcPts val="0"/>
+              </a:spcAft>
+              <a:buClrTx/>
+              <a:buSzPct val="90000"/>
+              <a:buFont typeface="Wingdings" panose="05000000000000000000" pitchFamily="2" charset="2"/>
+              <a:buNone/>
+              <a:tabLst/>
+              <a:defRPr sz="2400" kern="1200" spc="0" baseline="0">
+                <a:gradFill>
+                  <a:gsLst>
+                    <a:gs pos="1250">
+                      <a:schemeClr val="tx1"/>
+                    </a:gs>
+                    <a:gs pos="100000">
+                      <a:schemeClr val="tx1"/>
+                    </a:gs>
+                  </a:gsLst>
+                  <a:lin ang="5400000" scaled="0"/>
+                </a:gradFill>
+                <a:latin typeface="+mn-lt"/>
+                <a:ea typeface="+mn-ea"/>
+                <a:cs typeface="+mn-cs"/>
+              </a:defRPr>
+            </a:lvl3pPr>
+            <a:lvl4pPr marL="685800" marR="0" indent="0" algn="l" defTabSz="932742" rtl="0" eaLnBrk="1" fontAlgn="auto" latinLnBrk="0" hangingPunct="1">
+              <a:lnSpc>
+                <a:spcPct val="90000"/>
+              </a:lnSpc>
+              <a:spcBef>
+                <a:spcPct val="20000"/>
+              </a:spcBef>
+              <a:spcAft>
+                <a:spcPts val="0"/>
+              </a:spcAft>
+              <a:buClrTx/>
+              <a:buSzPct val="90000"/>
+              <a:buFont typeface="Wingdings" panose="05000000000000000000" pitchFamily="2" charset="2"/>
+              <a:buNone/>
+              <a:tabLst/>
+              <a:defRPr sz="2200" kern="1200" spc="0" baseline="0">
+                <a:gradFill>
+                  <a:gsLst>
+                    <a:gs pos="1250">
+                      <a:schemeClr val="tx1"/>
+                    </a:gs>
+                    <a:gs pos="100000">
+                      <a:schemeClr val="tx1"/>
+                    </a:gs>
+                  </a:gsLst>
+                  <a:lin ang="5400000" scaled="0"/>
+                </a:gradFill>
+                <a:latin typeface="+mn-lt"/>
+                <a:ea typeface="+mn-ea"/>
+                <a:cs typeface="+mn-cs"/>
+              </a:defRPr>
+            </a:lvl4pPr>
+            <a:lvl5pPr marL="914400" marR="0" indent="0" algn="l" defTabSz="932742" rtl="0" eaLnBrk="1" fontAlgn="auto" latinLnBrk="0" hangingPunct="1">
+              <a:lnSpc>
+                <a:spcPct val="90000"/>
+              </a:lnSpc>
+              <a:spcBef>
+                <a:spcPct val="20000"/>
+              </a:spcBef>
+              <a:spcAft>
+                <a:spcPts val="0"/>
+              </a:spcAft>
+              <a:buClrTx/>
+              <a:buSzPct val="90000"/>
+              <a:buFont typeface="Wingdings" panose="05000000000000000000" pitchFamily="2" charset="2"/>
+              <a:buNone/>
+              <a:tabLst/>
+              <a:defRPr sz="2200" kern="1200" spc="0" baseline="0">
+                <a:gradFill>
+                  <a:gsLst>
+                    <a:gs pos="1250">
+                      <a:schemeClr val="tx1"/>
+                    </a:gs>
+                    <a:gs pos="100000">
+                      <a:schemeClr val="tx1"/>
+                    </a:gs>
+                  </a:gsLst>
+                  <a:lin ang="5400000" scaled="0"/>
+                </a:gradFill>
+                <a:latin typeface="+mn-lt"/>
+                <a:ea typeface="+mn-ea"/>
+                <a:cs typeface="+mn-cs"/>
+              </a:defRPr>
+            </a:lvl5pPr>
+            <a:lvl6pPr marL="2565040" indent="-233186" algn="l" defTabSz="932742" rtl="0" eaLnBrk="1" latinLnBrk="0" hangingPunct="1">
+              <a:spcBef>
+                <a:spcPct val="20000"/>
+              </a:spcBef>
+              <a:buFont typeface="Arial" pitchFamily="34" charset="0"/>
+              <a:buChar char="•"/>
+              <a:defRPr sz="2000" kern="1200">
+                <a:solidFill>
+                  <a:schemeClr val="tx1"/>
+                </a:solidFill>
+                <a:latin typeface="+mn-lt"/>
+                <a:ea typeface="+mn-ea"/>
+                <a:cs typeface="+mn-cs"/>
+              </a:defRPr>
+            </a:lvl6pPr>
+            <a:lvl7pPr marL="3031412" indent="-233186" algn="l" defTabSz="932742" rtl="0" eaLnBrk="1" latinLnBrk="0" hangingPunct="1">
+              <a:spcBef>
+                <a:spcPct val="20000"/>
+              </a:spcBef>
+              <a:buFont typeface="Arial" pitchFamily="34" charset="0"/>
+              <a:buChar char="•"/>
+              <a:defRPr sz="2000" kern="1200">
+                <a:solidFill>
+                  <a:schemeClr val="tx1"/>
+                </a:solidFill>
+                <a:latin typeface="+mn-lt"/>
+                <a:ea typeface="+mn-ea"/>
+                <a:cs typeface="+mn-cs"/>
+              </a:defRPr>
+            </a:lvl7pPr>
+            <a:lvl8pPr marL="3497783" indent="-233186" algn="l" defTabSz="932742" rtl="0" eaLnBrk="1" latinLnBrk="0" hangingPunct="1">
+              <a:spcBef>
+                <a:spcPct val="20000"/>
+              </a:spcBef>
+              <a:buFont typeface="Arial" pitchFamily="34" charset="0"/>
+              <a:buChar char="•"/>
+              <a:defRPr sz="2000" kern="1200">
+                <a:solidFill>
+                  <a:schemeClr val="tx1"/>
+                </a:solidFill>
+                <a:latin typeface="+mn-lt"/>
+                <a:ea typeface="+mn-ea"/>
+                <a:cs typeface="+mn-cs"/>
+              </a:defRPr>
+            </a:lvl8pPr>
+            <a:lvl9pPr marL="3964155" indent="-233186" algn="l" defTabSz="932742" rtl="0" eaLnBrk="1" latinLnBrk="0" hangingPunct="1">
+              <a:spcBef>
+                <a:spcPct val="20000"/>
+              </a:spcBef>
+              <a:buFont typeface="Arial" pitchFamily="34" charset="0"/>
+              <a:buChar char="•"/>
+              <a:defRPr sz="2000" kern="1200">
+                <a:solidFill>
+                  <a:schemeClr val="tx1"/>
+                </a:solidFill>
+                <a:latin typeface="+mn-lt"/>
+                <a:ea typeface="+mn-ea"/>
+                <a:cs typeface="+mn-cs"/>
+              </a:defRPr>
+            </a:lvl9pPr>
+          </a:lstStyle>
+          <a:p>
+            <a:pPr lvl="0">
+              <a:lnSpc>
+                <a:spcPct val="90000"/>
+              </a:lnSpc>
+              <a:spcBef>
+                <a:spcPts val="1800"/>
+              </a:spcBef>
+            </a:pPr>
+            <a:endParaRPr lang="en-US" sz="1600" b="0" dirty="0">
+              <a:solidFill>
+                <a:srgbClr val="2F2F2F"/>
+              </a:solidFill>
+              <a:latin typeface="Segoe UI Semibold"/>
+            </a:endParaRPr>
+          </a:p>
+        </p:txBody>
+      </p:sp>
+    </p:spTree>
+    <p:extLst>
+      <p:ext uri="{BB962C8B-B14F-4D97-AF65-F5344CB8AC3E}">
+        <p14:creationId xmlns:p14="http://schemas.microsoft.com/office/powerpoint/2010/main" val="3651672785"/>
+      </p:ext>
+    </p:extLst>
+  </p:cSld>
+  <p:clrMapOvr>
+    <a:masterClrMapping/>
+  </p:clrMapOvr>
+  <p:transition>
+    <p:fade/>
+  </p:transition>
+</p:sld>
+</file>
+
+<file path=ppt/slides/slide11.xml><?xml version="1.0" encoding="utf-8"?>
+<p:sld xmlns:a="http://schemas.openxmlformats.org/drawingml/2006/main" xmlns:r="http://schemas.openxmlformats.org/officeDocument/2006/relationships" xmlns:p="http://schemas.openxmlformats.org/presentationml/2006/main">
+  <p:cSld>
+    <p:spTree>
+      <p:nvGrpSpPr>
+        <p:cNvPr id="1" name=""/>
+        <p:cNvGrpSpPr/>
+        <p:nvPr/>
+      </p:nvGrpSpPr>
+      <p:grpSpPr>
+        <a:xfrm>
+          <a:off x="0" y="0"/>
+          <a:ext cx="0" cy="0"/>
+          <a:chOff x="0" y="0"/>
+          <a:chExt cx="0" cy="0"/>
+        </a:xfrm>
+      </p:grpSpPr>
       <p:sp>
         <p:nvSpPr>
           <p:cNvPr id="2" name="Title 1"/>
@@ -12972,7 +13326,7 @@
 </p:sld>
 </file>
 
-<file path=ppt/slides/slide11.xml><?xml version="1.0" encoding="utf-8"?>
+<file path=ppt/slides/slide12.xml><?xml version="1.0" encoding="utf-8"?>
 <p:sld xmlns:a="http://schemas.openxmlformats.org/drawingml/2006/main" xmlns:r="http://schemas.openxmlformats.org/officeDocument/2006/relationships" xmlns:p="http://schemas.openxmlformats.org/presentationml/2006/main">
   <p:cSld>
     <p:spTree>
@@ -16021,7 +16375,13 @@
       </p:grpSpPr>
       <p:sp>
         <p:nvSpPr>
-          <p:cNvPr id="2" name="Title 1"/>
+          <p:cNvPr id="2" name="Title 1">
+            <a:extLst>
+              <a:ext uri="{FF2B5EF4-FFF2-40B4-BE49-F238E27FC236}">
+                <a16:creationId xmlns:a16="http://schemas.microsoft.com/office/drawing/2014/main" id="{EDFE6814-FC7B-428D-ABD1-F9538F8F20FB}"/>
+              </a:ext>
+            </a:extLst>
+          </p:cNvPr>
           <p:cNvSpPr>
             <a:spLocks noGrp="1"/>
           </p:cNvSpPr>
@@ -16036,7 +16396,162 @@
           <a:p>
             <a:r>
               <a:rPr lang="en-US" dirty="0"/>
-              <a:t>Demo</a:t>
+              <a:t>Sender Verification for Actionable Messages with Adaptive Cards </a:t>
+            </a:r>
+          </a:p>
+        </p:txBody>
+      </p:sp>
+      <p:sp>
+        <p:nvSpPr>
+          <p:cNvPr id="6" name="Text Placeholder 5">
+            <a:extLst>
+              <a:ext uri="{FF2B5EF4-FFF2-40B4-BE49-F238E27FC236}">
+                <a16:creationId xmlns:a16="http://schemas.microsoft.com/office/drawing/2014/main" id="{A3B7CCA7-FCC3-4D89-9A50-F502AE772104}"/>
+              </a:ext>
+            </a:extLst>
+          </p:cNvPr>
+          <p:cNvSpPr>
+            <a:spLocks noGrp="1"/>
+          </p:cNvSpPr>
+          <p:nvPr>
+            <p:ph type="body" sz="quarter" idx="11"/>
+          </p:nvPr>
+        </p:nvSpPr>
+        <p:spPr>
+          <a:xfrm>
+            <a:off x="465138" y="3214124"/>
+            <a:ext cx="4835991" cy="1252522"/>
+          </a:xfrm>
+        </p:spPr>
+        <p:txBody>
+          <a:bodyPr/>
+          <a:lstStyle/>
+          <a:p>
+            <a:r>
+              <a:rPr lang="en-US" sz="1800" dirty="0"/>
+              <a:t>Implementing DKIM and SPF</a:t>
+            </a:r>
+          </a:p>
+          <a:p>
+            <a:r>
+              <a:rPr lang="en-US" b="0" dirty="0">
+                <a:solidFill>
+                  <a:schemeClr val="tx1"/>
+                </a:solidFill>
+              </a:rPr>
+              <a:t>DKIM and SPF are industry standard ways to prove a sender's identity when sending emails over SMTP. Many companies already implement these standards to secure the emails they are already sending.</a:t>
+            </a:r>
+          </a:p>
+        </p:txBody>
+      </p:sp>
+      <p:sp>
+        <p:nvSpPr>
+          <p:cNvPr id="8" name="Text Placeholder 7">
+            <a:extLst>
+              <a:ext uri="{FF2B5EF4-FFF2-40B4-BE49-F238E27FC236}">
+                <a16:creationId xmlns:a16="http://schemas.microsoft.com/office/drawing/2014/main" id="{2D616C2B-3200-427C-B994-B761B3974AEE}"/>
+              </a:ext>
+            </a:extLst>
+          </p:cNvPr>
+          <p:cNvSpPr>
+            <a:spLocks noGrp="1"/>
+          </p:cNvSpPr>
+          <p:nvPr>
+            <p:ph type="body" sz="quarter" idx="13"/>
+          </p:nvPr>
+        </p:nvSpPr>
+        <p:spPr>
+          <a:xfrm>
+            <a:off x="7135347" y="3214124"/>
+            <a:ext cx="4862978" cy="2291268"/>
+          </a:xfrm>
+        </p:spPr>
+        <p:txBody>
+          <a:bodyPr/>
+          <a:lstStyle/>
+          <a:p>
+            <a:r>
+              <a:rPr lang="en-US" sz="1800" dirty="0"/>
+              <a:t>Signed card payloads</a:t>
+            </a:r>
+          </a:p>
+          <a:p>
+            <a:r>
+              <a:rPr lang="en-US" b="0" dirty="0">
+                <a:solidFill>
+                  <a:schemeClr val="tx1"/>
+                </a:solidFill>
+              </a:rPr>
+              <a:t>SPF/DKIM failure caused by sender setup or recipient tenant set custom security services in front of Office 365 services.</a:t>
+            </a:r>
+          </a:p>
+          <a:p>
+            <a:r>
+              <a:rPr lang="en-US" b="0" dirty="0">
+                <a:solidFill>
+                  <a:schemeClr val="tx1"/>
+                </a:solidFill>
+              </a:rPr>
+              <a:t>Your scenario for actionable messages requires sending from multiple email accounts..</a:t>
+            </a:r>
+          </a:p>
+          <a:p>
+            <a:r>
+              <a:rPr lang="en-US" b="0" dirty="0">
+                <a:solidFill>
+                  <a:schemeClr val="tx1"/>
+                </a:solidFill>
+              </a:rPr>
+              <a:t>Message body contains a payload in Microdata format that is encoded in a JSON </a:t>
+            </a:r>
+            <a:r>
+              <a:rPr lang="en-US" b="0">
+                <a:solidFill>
+                  <a:schemeClr val="tx1"/>
+                </a:solidFill>
+              </a:rPr>
+              <a:t>Web signature.</a:t>
+            </a:r>
+            <a:endParaRPr lang="en-US" b="0" dirty="0">
+              <a:solidFill>
+                <a:schemeClr val="tx1"/>
+              </a:solidFill>
+            </a:endParaRPr>
+          </a:p>
+          <a:p>
+            <a:endParaRPr lang="en-US" dirty="0"/>
+          </a:p>
+        </p:txBody>
+      </p:sp>
+      <p:sp>
+        <p:nvSpPr>
+          <p:cNvPr id="9" name="Text Placeholder 8">
+            <a:extLst>
+              <a:ext uri="{FF2B5EF4-FFF2-40B4-BE49-F238E27FC236}">
+                <a16:creationId xmlns:a16="http://schemas.microsoft.com/office/drawing/2014/main" id="{4A39E627-0A46-4ABD-ABA1-D44ED70D819A}"/>
+              </a:ext>
+            </a:extLst>
+          </p:cNvPr>
+          <p:cNvSpPr>
+            <a:spLocks noGrp="1"/>
+          </p:cNvSpPr>
+          <p:nvPr>
+            <p:ph type="body" sz="quarter" idx="10"/>
+          </p:nvPr>
+        </p:nvSpPr>
+        <p:spPr>
+          <a:xfrm>
+            <a:off x="465138" y="1919804"/>
+            <a:ext cx="7604125" cy="615553"/>
+          </a:xfrm>
+        </p:spPr>
+        <p:txBody>
+          <a:bodyPr/>
+          <a:lstStyle/>
+          <a:p>
+            <a:r>
+              <a:rPr lang="en-US" dirty="0"/>
+              <a:t>Office 365 requires sender verification in order to enable actionable messages via email. </a:t>
             </a:r>
           </a:p>
         </p:txBody>
@@ -16044,7 +16559,7 @@
     </p:spTree>
     <p:extLst>
       <p:ext uri="{BB962C8B-B14F-4D97-AF65-F5344CB8AC3E}">
-        <p14:creationId xmlns:p14="http://schemas.microsoft.com/office/powerpoint/2010/main" val="2913580386"/>
+        <p14:creationId xmlns:p14="http://schemas.microsoft.com/office/powerpoint/2010/main" val="656419953"/>
       </p:ext>
     </p:extLst>
   </p:cSld>
@@ -16074,50 +16589,9 @@
           <a:chExt cx="0" cy="0"/>
         </a:xfrm>
       </p:grpSpPr>
-      <p:pic>
-        <p:nvPicPr>
-          <p:cNvPr id="3" name="Picture 2">
-            <a:extLst>
-              <a:ext uri="{FF2B5EF4-FFF2-40B4-BE49-F238E27FC236}">
-                <a16:creationId xmlns:a16="http://schemas.microsoft.com/office/drawing/2014/main" id="{EE215EA7-7174-487D-949C-048DC5016E47}"/>
-              </a:ext>
-            </a:extLst>
-          </p:cNvPr>
-          <p:cNvPicPr>
-            <a:picLocks noChangeAspect="1"/>
-          </p:cNvPicPr>
-          <p:nvPr/>
-        </p:nvPicPr>
-        <p:blipFill rotWithShape="1">
-          <a:blip r:embed="rId2" cstate="screen">
-            <a:extLst>
-              <a:ext uri="{28A0092B-C50C-407E-A947-70E740481C1C}">
-                <a14:useLocalDpi xmlns:a14="http://schemas.microsoft.com/office/drawing/2010/main"/>
-              </a:ext>
-            </a:extLst>
-          </a:blip>
-          <a:srcRect l="27426" r="10166"/>
-          <a:stretch/>
-        </p:blipFill>
-        <p:spPr>
-          <a:xfrm>
-            <a:off x="5887091" y="0"/>
-            <a:ext cx="6549384" cy="6994525"/>
-          </a:xfrm>
-          <a:prstGeom prst="rect">
-            <a:avLst/>
-          </a:prstGeom>
-        </p:spPr>
-      </p:pic>
       <p:sp>
         <p:nvSpPr>
-          <p:cNvPr id="4" name="Title 3">
-            <a:extLst>
-              <a:ext uri="{FF2B5EF4-FFF2-40B4-BE49-F238E27FC236}">
-                <a16:creationId xmlns:a16="http://schemas.microsoft.com/office/drawing/2014/main" id="{8047349F-0B8F-4D12-A39C-718C1C57DDFF}"/>
-              </a:ext>
-            </a:extLst>
-          </p:cNvPr>
+          <p:cNvPr id="2" name="Title 1"/>
           <p:cNvSpPr>
             <a:spLocks noGrp="1"/>
           </p:cNvSpPr>
@@ -16125,278 +16599,22 @@
             <p:ph type="title"/>
           </p:nvPr>
         </p:nvSpPr>
-        <p:spPr>
-          <a:xfrm>
-            <a:off x="454864" y="1843063"/>
-            <a:ext cx="11533187" cy="411162"/>
-          </a:xfrm>
-        </p:spPr>
+        <p:spPr/>
         <p:txBody>
           <a:bodyPr/>
           <a:lstStyle/>
           <a:p>
             <a:r>
               <a:rPr lang="en-US" dirty="0"/>
-              <a:t>Summary</a:t>
-            </a:r>
-          </a:p>
-        </p:txBody>
-      </p:sp>
-      <p:sp>
-        <p:nvSpPr>
-          <p:cNvPr id="10" name="Text Placeholder 6">
-            <a:extLst>
-              <a:ext uri="{FF2B5EF4-FFF2-40B4-BE49-F238E27FC236}">
-                <a16:creationId xmlns:a16="http://schemas.microsoft.com/office/drawing/2014/main" id="{61D48218-75E0-4C6C-BFA7-A1010BADED35}"/>
-              </a:ext>
-            </a:extLst>
-          </p:cNvPr>
-          <p:cNvSpPr txBox="1">
-            <a:spLocks/>
-          </p:cNvSpPr>
-          <p:nvPr/>
-        </p:nvSpPr>
-        <p:spPr>
-          <a:xfrm>
-            <a:off x="465139" y="2621905"/>
-            <a:ext cx="4234184" cy="221599"/>
-          </a:xfrm>
-          <a:prstGeom prst="rect">
-            <a:avLst/>
-          </a:prstGeom>
-        </p:spPr>
-        <p:txBody>
-          <a:bodyPr vert="horz" wrap="square" lIns="0" tIns="0" rIns="0" bIns="0" rtlCol="0">
-            <a:spAutoFit/>
-          </a:bodyPr>
-          <a:lstStyle>
-            <a:lvl1pPr marL="0" marR="0" indent="0" algn="l" defTabSz="932742" rtl="0" eaLnBrk="1" fontAlgn="auto" latinLnBrk="0" hangingPunct="1">
-              <a:lnSpc>
-                <a:spcPts val="1800"/>
-              </a:lnSpc>
-              <a:spcBef>
-                <a:spcPts val="0"/>
-              </a:spcBef>
-              <a:spcAft>
-                <a:spcPts val="0"/>
-              </a:spcAft>
-              <a:buClrTx/>
-              <a:buSzPct val="90000"/>
-              <a:buFont typeface="Wingdings" panose="05000000000000000000" pitchFamily="2" charset="2"/>
-              <a:buNone/>
-              <a:tabLst/>
-              <a:defRPr sz="1400" b="1" kern="1200" spc="0" baseline="0">
-                <a:solidFill>
-                  <a:schemeClr val="tx1"/>
-                </a:solidFill>
-                <a:latin typeface="+mn-lt"/>
-                <a:ea typeface="+mn-ea"/>
-                <a:cs typeface="+mn-cs"/>
-              </a:defRPr>
-            </a:lvl1pPr>
-            <a:lvl2pPr marL="0" marR="0" indent="0" algn="l" defTabSz="932742" rtl="0" eaLnBrk="1" fontAlgn="auto" latinLnBrk="0" hangingPunct="1">
-              <a:lnSpc>
-                <a:spcPts val="1800"/>
-              </a:lnSpc>
-              <a:spcBef>
-                <a:spcPts val="0"/>
-              </a:spcBef>
-              <a:spcAft>
-                <a:spcPts val="0"/>
-              </a:spcAft>
-              <a:buClrTx/>
-              <a:buSzPct val="90000"/>
-              <a:buFont typeface="Wingdings" panose="05000000000000000000" pitchFamily="2" charset="2"/>
-              <a:buNone/>
-              <a:tabLst/>
-              <a:defRPr sz="1400" kern="1200" spc="0" baseline="0">
-                <a:solidFill>
-                  <a:schemeClr val="tx1"/>
-                </a:solidFill>
-                <a:latin typeface="+mn-lt"/>
-                <a:ea typeface="+mn-ea"/>
-                <a:cs typeface="+mn-cs"/>
-              </a:defRPr>
-            </a:lvl2pPr>
-            <a:lvl3pPr marL="457200" marR="0" indent="0" algn="l" defTabSz="932742" rtl="0" eaLnBrk="1" fontAlgn="auto" latinLnBrk="0" hangingPunct="1">
-              <a:lnSpc>
-                <a:spcPct val="90000"/>
-              </a:lnSpc>
-              <a:spcBef>
-                <a:spcPct val="20000"/>
-              </a:spcBef>
-              <a:spcAft>
-                <a:spcPts val="0"/>
-              </a:spcAft>
-              <a:buClrTx/>
-              <a:buSzPct val="90000"/>
-              <a:buFont typeface="Wingdings" panose="05000000000000000000" pitchFamily="2" charset="2"/>
-              <a:buNone/>
-              <a:tabLst/>
-              <a:defRPr sz="2400" kern="1200" spc="0" baseline="0">
-                <a:gradFill>
-                  <a:gsLst>
-                    <a:gs pos="1250">
-                      <a:schemeClr val="tx1"/>
-                    </a:gs>
-                    <a:gs pos="100000">
-                      <a:schemeClr val="tx1"/>
-                    </a:gs>
-                  </a:gsLst>
-                  <a:lin ang="5400000" scaled="0"/>
-                </a:gradFill>
-                <a:latin typeface="+mn-lt"/>
-                <a:ea typeface="+mn-ea"/>
-                <a:cs typeface="+mn-cs"/>
-              </a:defRPr>
-            </a:lvl3pPr>
-            <a:lvl4pPr marL="685800" marR="0" indent="0" algn="l" defTabSz="932742" rtl="0" eaLnBrk="1" fontAlgn="auto" latinLnBrk="0" hangingPunct="1">
-              <a:lnSpc>
-                <a:spcPct val="90000"/>
-              </a:lnSpc>
-              <a:spcBef>
-                <a:spcPct val="20000"/>
-              </a:spcBef>
-              <a:spcAft>
-                <a:spcPts val="0"/>
-              </a:spcAft>
-              <a:buClrTx/>
-              <a:buSzPct val="90000"/>
-              <a:buFont typeface="Wingdings" panose="05000000000000000000" pitchFamily="2" charset="2"/>
-              <a:buNone/>
-              <a:tabLst/>
-              <a:defRPr sz="2200" kern="1200" spc="0" baseline="0">
-                <a:gradFill>
-                  <a:gsLst>
-                    <a:gs pos="1250">
-                      <a:schemeClr val="tx1"/>
-                    </a:gs>
-                    <a:gs pos="100000">
-                      <a:schemeClr val="tx1"/>
-                    </a:gs>
-                  </a:gsLst>
-                  <a:lin ang="5400000" scaled="0"/>
-                </a:gradFill>
-                <a:latin typeface="+mn-lt"/>
-                <a:ea typeface="+mn-ea"/>
-                <a:cs typeface="+mn-cs"/>
-              </a:defRPr>
-            </a:lvl4pPr>
-            <a:lvl5pPr marL="914400" marR="0" indent="0" algn="l" defTabSz="932742" rtl="0" eaLnBrk="1" fontAlgn="auto" latinLnBrk="0" hangingPunct="1">
-              <a:lnSpc>
-                <a:spcPct val="90000"/>
-              </a:lnSpc>
-              <a:spcBef>
-                <a:spcPct val="20000"/>
-              </a:spcBef>
-              <a:spcAft>
-                <a:spcPts val="0"/>
-              </a:spcAft>
-              <a:buClrTx/>
-              <a:buSzPct val="90000"/>
-              <a:buFont typeface="Wingdings" panose="05000000000000000000" pitchFamily="2" charset="2"/>
-              <a:buNone/>
-              <a:tabLst/>
-              <a:defRPr sz="2200" kern="1200" spc="0" baseline="0">
-                <a:gradFill>
-                  <a:gsLst>
-                    <a:gs pos="1250">
-                      <a:schemeClr val="tx1"/>
-                    </a:gs>
-                    <a:gs pos="100000">
-                      <a:schemeClr val="tx1"/>
-                    </a:gs>
-                  </a:gsLst>
-                  <a:lin ang="5400000" scaled="0"/>
-                </a:gradFill>
-                <a:latin typeface="+mn-lt"/>
-                <a:ea typeface="+mn-ea"/>
-                <a:cs typeface="+mn-cs"/>
-              </a:defRPr>
-            </a:lvl5pPr>
-            <a:lvl6pPr marL="2565040" indent="-233186" algn="l" defTabSz="932742" rtl="0" eaLnBrk="1" latinLnBrk="0" hangingPunct="1">
-              <a:spcBef>
-                <a:spcPct val="20000"/>
-              </a:spcBef>
-              <a:buFont typeface="Arial" pitchFamily="34" charset="0"/>
-              <a:buChar char="•"/>
-              <a:defRPr sz="2000" kern="1200">
-                <a:solidFill>
-                  <a:schemeClr val="tx1"/>
-                </a:solidFill>
-                <a:latin typeface="+mn-lt"/>
-                <a:ea typeface="+mn-ea"/>
-                <a:cs typeface="+mn-cs"/>
-              </a:defRPr>
-            </a:lvl6pPr>
-            <a:lvl7pPr marL="3031412" indent="-233186" algn="l" defTabSz="932742" rtl="0" eaLnBrk="1" latinLnBrk="0" hangingPunct="1">
-              <a:spcBef>
-                <a:spcPct val="20000"/>
-              </a:spcBef>
-              <a:buFont typeface="Arial" pitchFamily="34" charset="0"/>
-              <a:buChar char="•"/>
-              <a:defRPr sz="2000" kern="1200">
-                <a:solidFill>
-                  <a:schemeClr val="tx1"/>
-                </a:solidFill>
-                <a:latin typeface="+mn-lt"/>
-                <a:ea typeface="+mn-ea"/>
-                <a:cs typeface="+mn-cs"/>
-              </a:defRPr>
-            </a:lvl7pPr>
-            <a:lvl8pPr marL="3497783" indent="-233186" algn="l" defTabSz="932742" rtl="0" eaLnBrk="1" latinLnBrk="0" hangingPunct="1">
-              <a:spcBef>
-                <a:spcPct val="20000"/>
-              </a:spcBef>
-              <a:buFont typeface="Arial" pitchFamily="34" charset="0"/>
-              <a:buChar char="•"/>
-              <a:defRPr sz="2000" kern="1200">
-                <a:solidFill>
-                  <a:schemeClr val="tx1"/>
-                </a:solidFill>
-                <a:latin typeface="+mn-lt"/>
-                <a:ea typeface="+mn-ea"/>
-                <a:cs typeface="+mn-cs"/>
-              </a:defRPr>
-            </a:lvl8pPr>
-            <a:lvl9pPr marL="3964155" indent="-233186" algn="l" defTabSz="932742" rtl="0" eaLnBrk="1" latinLnBrk="0" hangingPunct="1">
-              <a:spcBef>
-                <a:spcPct val="20000"/>
-              </a:spcBef>
-              <a:buFont typeface="Arial" pitchFamily="34" charset="0"/>
-              <a:buChar char="•"/>
-              <a:defRPr sz="2000" kern="1200">
-                <a:solidFill>
-                  <a:schemeClr val="tx1"/>
-                </a:solidFill>
-                <a:latin typeface="+mn-lt"/>
-                <a:ea typeface="+mn-ea"/>
-                <a:cs typeface="+mn-cs"/>
-              </a:defRPr>
-            </a:lvl9pPr>
-          </a:lstStyle>
-          <a:p>
-            <a:pPr lvl="0">
-              <a:lnSpc>
-                <a:spcPct val="90000"/>
-              </a:lnSpc>
-              <a:spcBef>
-                <a:spcPts val="1800"/>
-              </a:spcBef>
-            </a:pPr>
-            <a:endParaRPr lang="en-US" sz="1600" b="0" dirty="0">
-              <a:solidFill>
-                <a:srgbClr val="2F2F2F"/>
-              </a:solidFill>
-              <a:latin typeface="Segoe UI Semibold"/>
-            </a:endParaRPr>
+              <a:t>Demo</a:t>
+            </a:r>
           </a:p>
         </p:txBody>
       </p:sp>
     </p:spTree>
     <p:extLst>
       <p:ext uri="{BB962C8B-B14F-4D97-AF65-F5344CB8AC3E}">
-        <p14:creationId xmlns:p14="http://schemas.microsoft.com/office/powerpoint/2010/main" val="3651672785"/>
+        <p14:creationId xmlns:p14="http://schemas.microsoft.com/office/powerpoint/2010/main" val="2913580386"/>
       </p:ext>
     </p:extLst>
   </p:cSld>

</xml_diff>